<commit_message>
add hislip 2.0 figures
</commit_message>
<xml_diff>
--- a/20230215_VXI-11 通信の概要/560.pptx
+++ b/20230215_VXI-11 通信の概要/560.pptx
@@ -222,7 +222,7 @@
           <a:p>
             <a:fld id="{8A4CF053-040B-44B7-89E9-8CB547445B7F}" type="datetimeFigureOut">
               <a:rPr kumimoji="1" lang="ja-JP" altLang="en-US" smtClean="0"/>
-              <a:t>2023/2/23</a:t>
+              <a:t>2023/2/24</a:t>
             </a:fld>
             <a:endParaRPr kumimoji="1" lang="ja-JP" altLang="en-US"/>
           </a:p>
@@ -752,7 +752,7 @@
           <a:p>
             <a:fld id="{450CE236-8E69-46A3-A89B-50E3FB1BE869}" type="datetimeFigureOut">
               <a:rPr kumimoji="1" lang="ja-JP" altLang="en-US" smtClean="0"/>
-              <a:t>2023/2/23</a:t>
+              <a:t>2023/2/24</a:t>
             </a:fld>
             <a:endParaRPr kumimoji="1" lang="ja-JP" altLang="en-US"/>
           </a:p>
@@ -982,7 +982,7 @@
           <a:p>
             <a:fld id="{450CE236-8E69-46A3-A89B-50E3FB1BE869}" type="datetimeFigureOut">
               <a:rPr kumimoji="1" lang="ja-JP" altLang="en-US" smtClean="0"/>
-              <a:t>2023/2/23</a:t>
+              <a:t>2023/2/24</a:t>
             </a:fld>
             <a:endParaRPr kumimoji="1" lang="ja-JP" altLang="en-US"/>
           </a:p>
@@ -1222,7 +1222,7 @@
           <a:p>
             <a:fld id="{450CE236-8E69-46A3-A89B-50E3FB1BE869}" type="datetimeFigureOut">
               <a:rPr kumimoji="1" lang="ja-JP" altLang="en-US" smtClean="0"/>
-              <a:t>2023/2/23</a:t>
+              <a:t>2023/2/24</a:t>
             </a:fld>
             <a:endParaRPr kumimoji="1" lang="ja-JP" altLang="en-US"/>
           </a:p>
@@ -1452,7 +1452,7 @@
           <a:p>
             <a:fld id="{450CE236-8E69-46A3-A89B-50E3FB1BE869}" type="datetimeFigureOut">
               <a:rPr kumimoji="1" lang="ja-JP" altLang="en-US" smtClean="0"/>
-              <a:t>2023/2/23</a:t>
+              <a:t>2023/2/24</a:t>
             </a:fld>
             <a:endParaRPr kumimoji="1" lang="ja-JP" altLang="en-US"/>
           </a:p>
@@ -1727,7 +1727,7 @@
           <a:p>
             <a:fld id="{450CE236-8E69-46A3-A89B-50E3FB1BE869}" type="datetimeFigureOut">
               <a:rPr kumimoji="1" lang="ja-JP" altLang="en-US" smtClean="0"/>
-              <a:t>2023/2/23</a:t>
+              <a:t>2023/2/24</a:t>
             </a:fld>
             <a:endParaRPr kumimoji="1" lang="ja-JP" altLang="en-US"/>
           </a:p>
@@ -2056,7 +2056,7 @@
           <a:p>
             <a:fld id="{450CE236-8E69-46A3-A89B-50E3FB1BE869}" type="datetimeFigureOut">
               <a:rPr kumimoji="1" lang="ja-JP" altLang="en-US" smtClean="0"/>
-              <a:t>2023/2/23</a:t>
+              <a:t>2023/2/24</a:t>
             </a:fld>
             <a:endParaRPr kumimoji="1" lang="ja-JP" altLang="en-US"/>
           </a:p>
@@ -2532,7 +2532,7 @@
           <a:p>
             <a:fld id="{450CE236-8E69-46A3-A89B-50E3FB1BE869}" type="datetimeFigureOut">
               <a:rPr kumimoji="1" lang="ja-JP" altLang="en-US" smtClean="0"/>
-              <a:t>2023/2/23</a:t>
+              <a:t>2023/2/24</a:t>
             </a:fld>
             <a:endParaRPr kumimoji="1" lang="ja-JP" altLang="en-US"/>
           </a:p>
@@ -2673,7 +2673,7 @@
           <a:p>
             <a:fld id="{450CE236-8E69-46A3-A89B-50E3FB1BE869}" type="datetimeFigureOut">
               <a:rPr kumimoji="1" lang="ja-JP" altLang="en-US" smtClean="0"/>
-              <a:t>2023/2/23</a:t>
+              <a:t>2023/2/24</a:t>
             </a:fld>
             <a:endParaRPr kumimoji="1" lang="ja-JP" altLang="en-US"/>
           </a:p>
@@ -2786,7 +2786,7 @@
           <a:p>
             <a:fld id="{450CE236-8E69-46A3-A89B-50E3FB1BE869}" type="datetimeFigureOut">
               <a:rPr kumimoji="1" lang="ja-JP" altLang="en-US" smtClean="0"/>
-              <a:t>2023/2/23</a:t>
+              <a:t>2023/2/24</a:t>
             </a:fld>
             <a:endParaRPr kumimoji="1" lang="ja-JP" altLang="en-US"/>
           </a:p>
@@ -3129,7 +3129,7 @@
           <a:p>
             <a:fld id="{450CE236-8E69-46A3-A89B-50E3FB1BE869}" type="datetimeFigureOut">
               <a:rPr kumimoji="1" lang="ja-JP" altLang="en-US" smtClean="0"/>
-              <a:t>2023/2/23</a:t>
+              <a:t>2023/2/24</a:t>
             </a:fld>
             <a:endParaRPr kumimoji="1" lang="ja-JP" altLang="en-US"/>
           </a:p>
@@ -3417,7 +3417,7 @@
           <a:p>
             <a:fld id="{450CE236-8E69-46A3-A89B-50E3FB1BE869}" type="datetimeFigureOut">
               <a:rPr kumimoji="1" lang="ja-JP" altLang="en-US" smtClean="0"/>
-              <a:t>2023/2/23</a:t>
+              <a:t>2023/2/24</a:t>
             </a:fld>
             <a:endParaRPr kumimoji="1" lang="ja-JP" altLang="en-US"/>
           </a:p>
@@ -3690,7 +3690,7 @@
           <a:p>
             <a:fld id="{450CE236-8E69-46A3-A89B-50E3FB1BE869}" type="datetimeFigureOut">
               <a:rPr kumimoji="1" lang="ja-JP" altLang="en-US" smtClean="0"/>
-              <a:t>2023/2/23</a:t>
+              <a:t>2023/2/24</a:t>
             </a:fld>
             <a:endParaRPr kumimoji="1" lang="ja-JP" altLang="en-US"/>
           </a:p>
@@ -5490,6 +5490,9 @@
             <a:avLst/>
           </a:prstGeom>
           <a:noFill/>
+          <a:ln>
+            <a:noFill/>
+          </a:ln>
         </p:spPr>
         <p:txBody>
           <a:bodyPr wrap="square" rtlCol="0">
@@ -5527,6 +5530,9 @@
             <a:avLst/>
           </a:prstGeom>
           <a:noFill/>
+          <a:ln>
+            <a:noFill/>
+          </a:ln>
         </p:spPr>
         <p:txBody>
           <a:bodyPr wrap="square" rtlCol="0">
@@ -5564,6 +5570,9 @@
             <a:avLst/>
           </a:prstGeom>
           <a:noFill/>
+          <a:ln>
+            <a:noFill/>
+          </a:ln>
         </p:spPr>
         <p:txBody>
           <a:bodyPr wrap="square" rtlCol="0">
@@ -5600,6 +5609,9 @@
             <a:avLst/>
           </a:prstGeom>
           <a:noFill/>
+          <a:ln>
+            <a:noFill/>
+          </a:ln>
         </p:spPr>
         <p:txBody>
           <a:bodyPr wrap="square" rtlCol="0">
@@ -5649,6 +5661,9 @@
             <a:avLst/>
           </a:prstGeom>
           <a:noFill/>
+          <a:ln>
+            <a:noFill/>
+          </a:ln>
         </p:spPr>
         <p:txBody>
           <a:bodyPr wrap="square" rtlCol="0">
@@ -5754,6 +5769,11 @@
             <a:avLst/>
           </a:prstGeom>
           <a:noFill/>
+          <a:ln>
+            <a:solidFill>
+              <a:schemeClr val="tx1"/>
+            </a:solidFill>
+          </a:ln>
         </p:spPr>
         <p:style>
           <a:lnRef idx="2">
@@ -5813,6 +5833,11 @@
             <a:avLst/>
           </a:prstGeom>
           <a:noFill/>
+          <a:ln>
+            <a:solidFill>
+              <a:schemeClr val="tx1"/>
+            </a:solidFill>
+          </a:ln>
         </p:spPr>
         <p:style>
           <a:lnRef idx="2">

</xml_diff>